<commit_message>
Amazon v4, ppt v2
</commit_message>
<xml_diff>
--- a/Product_review.pptx
+++ b/Product_review.pptx
@@ -4762,12 +4762,314 @@
           <a:chExt cx="0" cy="0"/>
         </a:xfrm>
       </p:grpSpPr>
+      <p:sp>
+        <p:nvSpPr>
+          <p:cNvPr id="4" name="TextBox 3">
+            <a:extLst>
+              <a:ext uri="{FF2B5EF4-FFF2-40B4-BE49-F238E27FC236}">
+                <a16:creationId xmlns:a16="http://schemas.microsoft.com/office/drawing/2014/main" id="{2FF64F48-4A48-1722-8289-8BD888170FA7}"/>
+              </a:ext>
+            </a:extLst>
+          </p:cNvPr>
+          <p:cNvSpPr txBox="1"/>
+          <p:nvPr/>
+        </p:nvSpPr>
+        <p:spPr>
+          <a:xfrm>
+            <a:off x="381980" y="1324145"/>
+            <a:ext cx="11361682" cy="707886"/>
+          </a:xfrm>
+          <a:prstGeom prst="rect">
+            <a:avLst/>
+          </a:prstGeom>
+          <a:noFill/>
+        </p:spPr>
+        <p:txBody>
+          <a:bodyPr wrap="square" rtlCol="0">
+            <a:spAutoFit/>
+          </a:bodyPr>
+          <a:lstStyle/>
+          <a:p>
+            <a:pPr algn="just"/>
+            <a:r>
+              <a:rPr lang="en-US" sz="2000" dirty="0">
+                <a:latin typeface="Cambria" panose="02040503050406030204" pitchFamily="18" charset="0"/>
+                <a:ea typeface="Cambria" panose="02040503050406030204" pitchFamily="18" charset="0"/>
+              </a:rPr>
+              <a:t>The table is like a list of Amazon products. It helps us understand different products, their prices, and how much people liked them.</a:t>
+            </a:r>
+          </a:p>
+        </p:txBody>
+      </p:sp>
+      <p:sp>
+        <p:nvSpPr>
+          <p:cNvPr id="6" name="TextBox 5">
+            <a:extLst>
+              <a:ext uri="{FF2B5EF4-FFF2-40B4-BE49-F238E27FC236}">
+                <a16:creationId xmlns:a16="http://schemas.microsoft.com/office/drawing/2014/main" id="{0FD849B7-EEE4-9AC7-0329-27603C368AE1}"/>
+              </a:ext>
+            </a:extLst>
+          </p:cNvPr>
+          <p:cNvSpPr txBox="1"/>
+          <p:nvPr/>
+        </p:nvSpPr>
+        <p:spPr>
+          <a:xfrm>
+            <a:off x="357352" y="0"/>
+            <a:ext cx="7031420" cy="1354217"/>
+          </a:xfrm>
+          <a:prstGeom prst="rect">
+            <a:avLst/>
+          </a:prstGeom>
+          <a:noFill/>
+        </p:spPr>
+        <p:txBody>
+          <a:bodyPr wrap="square" rtlCol="0">
+            <a:spAutoFit/>
+          </a:bodyPr>
+          <a:lstStyle/>
+          <a:p>
+            <a:r>
+              <a:rPr lang="en-SG" sz="2200" b="1" dirty="0">
+                <a:latin typeface="Cambria" panose="02040503050406030204" pitchFamily="18" charset="0"/>
+                <a:ea typeface="Cambria" panose="02040503050406030204" pitchFamily="18" charset="0"/>
+              </a:rPr>
+              <a:t>Product Table Review</a:t>
+            </a:r>
+          </a:p>
+          <a:p>
+            <a:pPr marL="342900" indent="-342900">
+              <a:buFont typeface="Arial" panose="020B0604020202020204" pitchFamily="34" charset="0"/>
+              <a:buChar char="•"/>
+            </a:pPr>
+            <a:r>
+              <a:rPr lang="en-SG" sz="2000" dirty="0">
+                <a:latin typeface="Cambria" panose="02040503050406030204" pitchFamily="18" charset="0"/>
+                <a:ea typeface="Cambria" panose="02040503050406030204" pitchFamily="18" charset="0"/>
+              </a:rPr>
+              <a:t>Detailed Product Information</a:t>
+            </a:r>
+          </a:p>
+          <a:p>
+            <a:pPr marL="342900" indent="-342900">
+              <a:buFont typeface="Arial" panose="020B0604020202020204" pitchFamily="34" charset="0"/>
+              <a:buChar char="•"/>
+            </a:pPr>
+            <a:r>
+              <a:rPr lang="en-SG" sz="2000" dirty="0">
+                <a:latin typeface="Cambria" panose="02040503050406030204" pitchFamily="18" charset="0"/>
+                <a:ea typeface="Cambria" panose="02040503050406030204" pitchFamily="18" charset="0"/>
+              </a:rPr>
+              <a:t>Product </a:t>
+            </a:r>
+            <a:r>
+              <a:rPr lang="en-SG" sz="2000" dirty="0" err="1">
+                <a:latin typeface="Cambria" panose="02040503050406030204" pitchFamily="18" charset="0"/>
+                <a:ea typeface="Cambria" panose="02040503050406030204" pitchFamily="18" charset="0"/>
+              </a:rPr>
+              <a:t>Catalog</a:t>
+            </a:r>
+            <a:r>
+              <a:rPr lang="en-SG" sz="2000" dirty="0">
+                <a:latin typeface="Cambria" panose="02040503050406030204" pitchFamily="18" charset="0"/>
+                <a:ea typeface="Cambria" panose="02040503050406030204" pitchFamily="18" charset="0"/>
+              </a:rPr>
+              <a:t> and Pricing</a:t>
+            </a:r>
+          </a:p>
+          <a:p>
+            <a:pPr marL="342900" indent="-342900">
+              <a:buFont typeface="Arial" panose="020B0604020202020204" pitchFamily="34" charset="0"/>
+              <a:buChar char="•"/>
+            </a:pPr>
+            <a:r>
+              <a:rPr lang="en-SG" sz="2000" dirty="0">
+                <a:latin typeface="Cambria" panose="02040503050406030204" pitchFamily="18" charset="0"/>
+                <a:ea typeface="Cambria" panose="02040503050406030204" pitchFamily="18" charset="0"/>
+              </a:rPr>
+              <a:t>Product Ratings, Pricing, Discount Price and Discounts</a:t>
+            </a:r>
+          </a:p>
+        </p:txBody>
+      </p:sp>
+      <p:sp>
+        <p:nvSpPr>
+          <p:cNvPr id="8" name="TextBox 7">
+            <a:extLst>
+              <a:ext uri="{FF2B5EF4-FFF2-40B4-BE49-F238E27FC236}">
+                <a16:creationId xmlns:a16="http://schemas.microsoft.com/office/drawing/2014/main" id="{AB0F1A3E-29A7-7EE1-8426-22A241F3BA1E}"/>
+              </a:ext>
+            </a:extLst>
+          </p:cNvPr>
+          <p:cNvSpPr txBox="1"/>
+          <p:nvPr/>
+        </p:nvSpPr>
+        <p:spPr>
+          <a:xfrm>
+            <a:off x="357352" y="4640810"/>
+            <a:ext cx="5010139" cy="2246769"/>
+          </a:xfrm>
+          <a:prstGeom prst="rect">
+            <a:avLst/>
+          </a:prstGeom>
+          <a:noFill/>
+        </p:spPr>
+        <p:txBody>
+          <a:bodyPr wrap="square" rtlCol="0">
+            <a:spAutoFit/>
+          </a:bodyPr>
+          <a:lstStyle/>
+          <a:p>
+            <a:pPr algn="just"/>
+            <a:r>
+              <a:rPr lang="en-US" sz="2000" dirty="0">
+                <a:latin typeface="Cambria" panose="02040503050406030204" pitchFamily="18" charset="0"/>
+                <a:ea typeface="Cambria" panose="02040503050406030204" pitchFamily="18" charset="0"/>
+              </a:rPr>
+              <a:t>This table helps to us understand that Amazon has a wide variety of products in different categories. We can see the average rating of each product and compare the prices of different products. We can also see how much discount is offered on each product.</a:t>
+            </a:r>
+            <a:endParaRPr lang="en-SG" sz="2000" dirty="0">
+              <a:latin typeface="Cambria" panose="02040503050406030204" pitchFamily="18" charset="0"/>
+              <a:ea typeface="Cambria" panose="02040503050406030204" pitchFamily="18" charset="0"/>
+            </a:endParaRPr>
+          </a:p>
+        </p:txBody>
+      </p:sp>
+      <p:sp>
+        <p:nvSpPr>
+          <p:cNvPr id="9" name="TextBox 8">
+            <a:extLst>
+              <a:ext uri="{FF2B5EF4-FFF2-40B4-BE49-F238E27FC236}">
+                <a16:creationId xmlns:a16="http://schemas.microsoft.com/office/drawing/2014/main" id="{D06543C7-EF94-D360-51A0-B2B0CAD61E32}"/>
+              </a:ext>
+            </a:extLst>
+          </p:cNvPr>
+          <p:cNvSpPr txBox="1"/>
+          <p:nvPr/>
+        </p:nvSpPr>
+        <p:spPr>
+          <a:xfrm>
+            <a:off x="381980" y="2032031"/>
+            <a:ext cx="4813738" cy="2554545"/>
+          </a:xfrm>
+          <a:prstGeom prst="rect">
+            <a:avLst/>
+          </a:prstGeom>
+          <a:noFill/>
+        </p:spPr>
+        <p:txBody>
+          <a:bodyPr wrap="square" rtlCol="0">
+            <a:spAutoFit/>
+          </a:bodyPr>
+          <a:lstStyle/>
+          <a:p>
+            <a:r>
+              <a:rPr lang="en-SG" sz="2000" b="1" dirty="0">
+                <a:latin typeface="Cambria" panose="02040503050406030204" pitchFamily="18" charset="0"/>
+                <a:ea typeface="Cambria" panose="02040503050406030204" pitchFamily="18" charset="0"/>
+              </a:rPr>
+              <a:t>Let's explore each part:</a:t>
+            </a:r>
+          </a:p>
+          <a:p>
+            <a:pPr marL="342900" indent="-342900">
+              <a:buFont typeface="Arial" panose="020B0604020202020204" pitchFamily="34" charset="0"/>
+              <a:buChar char="•"/>
+            </a:pPr>
+            <a:r>
+              <a:rPr lang="en-SG" sz="2000" dirty="0">
+                <a:latin typeface="Cambria" panose="02040503050406030204" pitchFamily="18" charset="0"/>
+                <a:ea typeface="Cambria" panose="02040503050406030204" pitchFamily="18" charset="0"/>
+              </a:rPr>
+              <a:t>Category and Image</a:t>
+            </a:r>
+          </a:p>
+          <a:p>
+            <a:pPr marL="342900" indent="-342900">
+              <a:buFont typeface="Arial" panose="020B0604020202020204" pitchFamily="34" charset="0"/>
+              <a:buChar char="•"/>
+            </a:pPr>
+            <a:r>
+              <a:rPr lang="en-SG" sz="2000" dirty="0">
+                <a:latin typeface="Cambria" panose="02040503050406030204" pitchFamily="18" charset="0"/>
+                <a:ea typeface="Cambria" panose="02040503050406030204" pitchFamily="18" charset="0"/>
+              </a:rPr>
+              <a:t>Product</a:t>
+            </a:r>
+          </a:p>
+          <a:p>
+            <a:pPr marL="342900" indent="-342900">
+              <a:buFont typeface="Arial" panose="020B0604020202020204" pitchFamily="34" charset="0"/>
+              <a:buChar char="•"/>
+            </a:pPr>
+            <a:r>
+              <a:rPr lang="en-SG" sz="2000" dirty="0">
+                <a:latin typeface="Cambria" panose="02040503050406030204" pitchFamily="18" charset="0"/>
+                <a:ea typeface="Cambria" panose="02040503050406030204" pitchFamily="18" charset="0"/>
+              </a:rPr>
+              <a:t>Link</a:t>
+            </a:r>
+          </a:p>
+          <a:p>
+            <a:pPr marL="342900" indent="-342900">
+              <a:buFont typeface="Arial" panose="020B0604020202020204" pitchFamily="34" charset="0"/>
+              <a:buChar char="•"/>
+            </a:pPr>
+            <a:r>
+              <a:rPr lang="en-SG" sz="2000" dirty="0">
+                <a:latin typeface="Cambria" panose="02040503050406030204" pitchFamily="18" charset="0"/>
+                <a:ea typeface="Cambria" panose="02040503050406030204" pitchFamily="18" charset="0"/>
+              </a:rPr>
+              <a:t>Average Rating</a:t>
+            </a:r>
+          </a:p>
+          <a:p>
+            <a:pPr marL="342900" indent="-342900">
+              <a:buFont typeface="Arial" panose="020B0604020202020204" pitchFamily="34" charset="0"/>
+              <a:buChar char="•"/>
+            </a:pPr>
+            <a:r>
+              <a:rPr lang="en-SG" sz="2000" dirty="0">
+                <a:latin typeface="Cambria" panose="02040503050406030204" pitchFamily="18" charset="0"/>
+                <a:ea typeface="Cambria" panose="02040503050406030204" pitchFamily="18" charset="0"/>
+              </a:rPr>
+              <a:t>Sum of Actual Price</a:t>
+            </a:r>
+          </a:p>
+          <a:p>
+            <a:pPr marL="342900" indent="-342900">
+              <a:buFont typeface="Arial" panose="020B0604020202020204" pitchFamily="34" charset="0"/>
+              <a:buChar char="•"/>
+            </a:pPr>
+            <a:r>
+              <a:rPr lang="en-SG" sz="2000" dirty="0">
+                <a:latin typeface="Cambria" panose="02040503050406030204" pitchFamily="18" charset="0"/>
+                <a:ea typeface="Cambria" panose="02040503050406030204" pitchFamily="18" charset="0"/>
+              </a:rPr>
+              <a:t>Sum of Discount Price</a:t>
+            </a:r>
+          </a:p>
+          <a:p>
+            <a:pPr marL="342900" indent="-342900">
+              <a:buFont typeface="Arial" panose="020B0604020202020204" pitchFamily="34" charset="0"/>
+              <a:buChar char="•"/>
+            </a:pPr>
+            <a:r>
+              <a:rPr lang="en-SG" sz="2000" dirty="0">
+                <a:latin typeface="Cambria" panose="02040503050406030204" pitchFamily="18" charset="0"/>
+                <a:ea typeface="Cambria" panose="02040503050406030204" pitchFamily="18" charset="0"/>
+              </a:rPr>
+              <a:t>Sum of Discount%</a:t>
+            </a:r>
+          </a:p>
+        </p:txBody>
+      </p:sp>
       <p:pic>
         <p:nvPicPr>
-          <p:cNvPr id="5" name="Picture 4">
-            <a:extLst>
-              <a:ext uri="{FF2B5EF4-FFF2-40B4-BE49-F238E27FC236}">
-                <a16:creationId xmlns:a16="http://schemas.microsoft.com/office/drawing/2014/main" id="{377D56AE-E43E-A4BD-2CC5-B637880DB5DE}"/>
+          <p:cNvPr id="3" name="Picture 2">
+            <a:extLst>
+              <a:ext uri="{FF2B5EF4-FFF2-40B4-BE49-F238E27FC236}">
+                <a16:creationId xmlns:a16="http://schemas.microsoft.com/office/drawing/2014/main" id="{B974E8BD-A4CE-6D11-9E2C-C52333D013EC}"/>
               </a:ext>
             </a:extLst>
           </p:cNvPr>
@@ -4784,316 +5086,14 @@
         </p:blipFill>
         <p:spPr>
           <a:xfrm>
-            <a:off x="5367491" y="2217190"/>
-            <a:ext cx="6665120" cy="4073422"/>
+            <a:off x="5316692" y="2238545"/>
+            <a:ext cx="6818332" cy="3915420"/>
           </a:xfrm>
           <a:prstGeom prst="rect">
             <a:avLst/>
           </a:prstGeom>
         </p:spPr>
       </p:pic>
-      <p:sp>
-        <p:nvSpPr>
-          <p:cNvPr id="4" name="TextBox 3">
-            <a:extLst>
-              <a:ext uri="{FF2B5EF4-FFF2-40B4-BE49-F238E27FC236}">
-                <a16:creationId xmlns:a16="http://schemas.microsoft.com/office/drawing/2014/main" id="{2FF64F48-4A48-1722-8289-8BD888170FA7}"/>
-              </a:ext>
-            </a:extLst>
-          </p:cNvPr>
-          <p:cNvSpPr txBox="1"/>
-          <p:nvPr/>
-        </p:nvSpPr>
-        <p:spPr>
-          <a:xfrm>
-            <a:off x="381980" y="1324145"/>
-            <a:ext cx="11361682" cy="707886"/>
-          </a:xfrm>
-          <a:prstGeom prst="rect">
-            <a:avLst/>
-          </a:prstGeom>
-          <a:noFill/>
-        </p:spPr>
-        <p:txBody>
-          <a:bodyPr wrap="square" rtlCol="0">
-            <a:spAutoFit/>
-          </a:bodyPr>
-          <a:lstStyle/>
-          <a:p>
-            <a:pPr algn="just"/>
-            <a:r>
-              <a:rPr lang="en-US" sz="2000" dirty="0">
-                <a:latin typeface="Cambria" panose="02040503050406030204" pitchFamily="18" charset="0"/>
-                <a:ea typeface="Cambria" panose="02040503050406030204" pitchFamily="18" charset="0"/>
-              </a:rPr>
-              <a:t>The table is like a list of Amazon products. It helps us understand different products, their prices, and how much people liked them.</a:t>
-            </a:r>
-          </a:p>
-        </p:txBody>
-      </p:sp>
-      <p:sp>
-        <p:nvSpPr>
-          <p:cNvPr id="6" name="TextBox 5">
-            <a:extLst>
-              <a:ext uri="{FF2B5EF4-FFF2-40B4-BE49-F238E27FC236}">
-                <a16:creationId xmlns:a16="http://schemas.microsoft.com/office/drawing/2014/main" id="{0FD849B7-EEE4-9AC7-0329-27603C368AE1}"/>
-              </a:ext>
-            </a:extLst>
-          </p:cNvPr>
-          <p:cNvSpPr txBox="1"/>
-          <p:nvPr/>
-        </p:nvSpPr>
-        <p:spPr>
-          <a:xfrm>
-            <a:off x="357352" y="0"/>
-            <a:ext cx="7031420" cy="1354217"/>
-          </a:xfrm>
-          <a:prstGeom prst="rect">
-            <a:avLst/>
-          </a:prstGeom>
-          <a:noFill/>
-        </p:spPr>
-        <p:txBody>
-          <a:bodyPr wrap="square" rtlCol="0">
-            <a:spAutoFit/>
-          </a:bodyPr>
-          <a:lstStyle/>
-          <a:p>
-            <a:r>
-              <a:rPr lang="en-SG" sz="2200" b="1" dirty="0">
-                <a:latin typeface="Cambria" panose="02040503050406030204" pitchFamily="18" charset="0"/>
-                <a:ea typeface="Cambria" panose="02040503050406030204" pitchFamily="18" charset="0"/>
-              </a:rPr>
-              <a:t>Product Table Review</a:t>
-            </a:r>
-          </a:p>
-          <a:p>
-            <a:pPr marL="342900" indent="-342900">
-              <a:buFont typeface="Arial" panose="020B0604020202020204" pitchFamily="34" charset="0"/>
-              <a:buChar char="•"/>
-            </a:pPr>
-            <a:r>
-              <a:rPr lang="en-SG" sz="2000" dirty="0">
-                <a:latin typeface="Cambria" panose="02040503050406030204" pitchFamily="18" charset="0"/>
-                <a:ea typeface="Cambria" panose="02040503050406030204" pitchFamily="18" charset="0"/>
-              </a:rPr>
-              <a:t>Detailed Product Information</a:t>
-            </a:r>
-          </a:p>
-          <a:p>
-            <a:pPr marL="342900" indent="-342900">
-              <a:buFont typeface="Arial" panose="020B0604020202020204" pitchFamily="34" charset="0"/>
-              <a:buChar char="•"/>
-            </a:pPr>
-            <a:r>
-              <a:rPr lang="en-SG" sz="2000" dirty="0">
-                <a:latin typeface="Cambria" panose="02040503050406030204" pitchFamily="18" charset="0"/>
-                <a:ea typeface="Cambria" panose="02040503050406030204" pitchFamily="18" charset="0"/>
-              </a:rPr>
-              <a:t>Product </a:t>
-            </a:r>
-            <a:r>
-              <a:rPr lang="en-SG" sz="2000" dirty="0" err="1">
-                <a:latin typeface="Cambria" panose="02040503050406030204" pitchFamily="18" charset="0"/>
-                <a:ea typeface="Cambria" panose="02040503050406030204" pitchFamily="18" charset="0"/>
-              </a:rPr>
-              <a:t>Catalog</a:t>
-            </a:r>
-            <a:r>
-              <a:rPr lang="en-SG" sz="2000" dirty="0">
-                <a:latin typeface="Cambria" panose="02040503050406030204" pitchFamily="18" charset="0"/>
-                <a:ea typeface="Cambria" panose="02040503050406030204" pitchFamily="18" charset="0"/>
-              </a:rPr>
-              <a:t> and Pricing</a:t>
-            </a:r>
-          </a:p>
-          <a:p>
-            <a:pPr marL="342900" indent="-342900">
-              <a:buFont typeface="Arial" panose="020B0604020202020204" pitchFamily="34" charset="0"/>
-              <a:buChar char="•"/>
-            </a:pPr>
-            <a:r>
-              <a:rPr lang="en-SG" sz="2000" dirty="0">
-                <a:latin typeface="Cambria" panose="02040503050406030204" pitchFamily="18" charset="0"/>
-                <a:ea typeface="Cambria" panose="02040503050406030204" pitchFamily="18" charset="0"/>
-              </a:rPr>
-              <a:t>Product Ratings, Pricing, Discount Price and Discounts</a:t>
-            </a:r>
-          </a:p>
-        </p:txBody>
-      </p:sp>
-      <p:sp>
-        <p:nvSpPr>
-          <p:cNvPr id="8" name="TextBox 7">
-            <a:extLst>
-              <a:ext uri="{FF2B5EF4-FFF2-40B4-BE49-F238E27FC236}">
-                <a16:creationId xmlns:a16="http://schemas.microsoft.com/office/drawing/2014/main" id="{AB0F1A3E-29A7-7EE1-8426-22A241F3BA1E}"/>
-              </a:ext>
-            </a:extLst>
-          </p:cNvPr>
-          <p:cNvSpPr txBox="1"/>
-          <p:nvPr/>
-        </p:nvSpPr>
-        <p:spPr>
-          <a:xfrm>
-            <a:off x="357352" y="4640810"/>
-            <a:ext cx="5010139" cy="2246769"/>
-          </a:xfrm>
-          <a:prstGeom prst="rect">
-            <a:avLst/>
-          </a:prstGeom>
-          <a:noFill/>
-        </p:spPr>
-        <p:txBody>
-          <a:bodyPr wrap="square" rtlCol="0">
-            <a:spAutoFit/>
-          </a:bodyPr>
-          <a:lstStyle/>
-          <a:p>
-            <a:pPr algn="just"/>
-            <a:r>
-              <a:rPr lang="en-US" sz="2000" dirty="0">
-                <a:latin typeface="Cambria" panose="02040503050406030204" pitchFamily="18" charset="0"/>
-                <a:ea typeface="Cambria" panose="02040503050406030204" pitchFamily="18" charset="0"/>
-              </a:rPr>
-              <a:t>This table helps to us understand that Amazon has a wide variety of products in different categories. We can see the average rating of each product and compare the prices of different products. We can also see how much discount is offered on each product.</a:t>
-            </a:r>
-            <a:endParaRPr lang="en-SG" sz="2000" dirty="0">
-              <a:latin typeface="Cambria" panose="02040503050406030204" pitchFamily="18" charset="0"/>
-              <a:ea typeface="Cambria" panose="02040503050406030204" pitchFamily="18" charset="0"/>
-            </a:endParaRPr>
-          </a:p>
-        </p:txBody>
-      </p:sp>
-      <p:sp>
-        <p:nvSpPr>
-          <p:cNvPr id="9" name="TextBox 8">
-            <a:extLst>
-              <a:ext uri="{FF2B5EF4-FFF2-40B4-BE49-F238E27FC236}">
-                <a16:creationId xmlns:a16="http://schemas.microsoft.com/office/drawing/2014/main" id="{D06543C7-EF94-D360-51A0-B2B0CAD61E32}"/>
-              </a:ext>
-            </a:extLst>
-          </p:cNvPr>
-          <p:cNvSpPr txBox="1"/>
-          <p:nvPr/>
-        </p:nvSpPr>
-        <p:spPr>
-          <a:xfrm>
-            <a:off x="381980" y="2032031"/>
-            <a:ext cx="4813738" cy="2554545"/>
-          </a:xfrm>
-          <a:prstGeom prst="rect">
-            <a:avLst/>
-          </a:prstGeom>
-          <a:noFill/>
-        </p:spPr>
-        <p:txBody>
-          <a:bodyPr wrap="square" rtlCol="0">
-            <a:spAutoFit/>
-          </a:bodyPr>
-          <a:lstStyle/>
-          <a:p>
-            <a:r>
-              <a:rPr lang="en-SG" sz="2000" b="1" dirty="0">
-                <a:latin typeface="Cambria" panose="02040503050406030204" pitchFamily="18" charset="0"/>
-                <a:ea typeface="Cambria" panose="02040503050406030204" pitchFamily="18" charset="0"/>
-              </a:rPr>
-              <a:t>Let's explore each part:</a:t>
-            </a:r>
-          </a:p>
-          <a:p>
-            <a:pPr marL="342900" indent="-342900">
-              <a:buFont typeface="Arial" panose="020B0604020202020204" pitchFamily="34" charset="0"/>
-              <a:buChar char="•"/>
-            </a:pPr>
-            <a:r>
-              <a:rPr lang="en-SG" sz="2000" dirty="0">
-                <a:latin typeface="Cambria" panose="02040503050406030204" pitchFamily="18" charset="0"/>
-                <a:ea typeface="Cambria" panose="02040503050406030204" pitchFamily="18" charset="0"/>
-              </a:rPr>
-              <a:t>Category and Image</a:t>
-            </a:r>
-          </a:p>
-          <a:p>
-            <a:pPr marL="342900" indent="-342900">
-              <a:buFont typeface="Arial" panose="020B0604020202020204" pitchFamily="34" charset="0"/>
-              <a:buChar char="•"/>
-            </a:pPr>
-            <a:r>
-              <a:rPr lang="en-SG" sz="2000" dirty="0">
-                <a:latin typeface="Cambria" panose="02040503050406030204" pitchFamily="18" charset="0"/>
-                <a:ea typeface="Cambria" panose="02040503050406030204" pitchFamily="18" charset="0"/>
-              </a:rPr>
-              <a:t>Product</a:t>
-            </a:r>
-          </a:p>
-          <a:p>
-            <a:pPr marL="342900" indent="-342900">
-              <a:buFont typeface="Arial" panose="020B0604020202020204" pitchFamily="34" charset="0"/>
-              <a:buChar char="•"/>
-            </a:pPr>
-            <a:r>
-              <a:rPr lang="en-SG" sz="2000" dirty="0">
-                <a:latin typeface="Cambria" panose="02040503050406030204" pitchFamily="18" charset="0"/>
-                <a:ea typeface="Cambria" panose="02040503050406030204" pitchFamily="18" charset="0"/>
-              </a:rPr>
-              <a:t>Link</a:t>
-            </a:r>
-          </a:p>
-          <a:p>
-            <a:pPr marL="342900" indent="-342900">
-              <a:buFont typeface="Arial" panose="020B0604020202020204" pitchFamily="34" charset="0"/>
-              <a:buChar char="•"/>
-            </a:pPr>
-            <a:r>
-              <a:rPr lang="en-SG" sz="2000" dirty="0">
-                <a:latin typeface="Cambria" panose="02040503050406030204" pitchFamily="18" charset="0"/>
-                <a:ea typeface="Cambria" panose="02040503050406030204" pitchFamily="18" charset="0"/>
-              </a:rPr>
-              <a:t>Average Rating</a:t>
-            </a:r>
-          </a:p>
-          <a:p>
-            <a:pPr marL="342900" indent="-342900">
-              <a:buFont typeface="Arial" panose="020B0604020202020204" pitchFamily="34" charset="0"/>
-              <a:buChar char="•"/>
-            </a:pPr>
-            <a:r>
-              <a:rPr lang="en-SG" sz="2000" dirty="0">
-                <a:latin typeface="Cambria" panose="02040503050406030204" pitchFamily="18" charset="0"/>
-                <a:ea typeface="Cambria" panose="02040503050406030204" pitchFamily="18" charset="0"/>
-              </a:rPr>
-              <a:t>Sum of Actual Price</a:t>
-            </a:r>
-          </a:p>
-          <a:p>
-            <a:pPr marL="342900" indent="-342900">
-              <a:buFont typeface="Arial" panose="020B0604020202020204" pitchFamily="34" charset="0"/>
-              <a:buChar char="•"/>
-            </a:pPr>
-            <a:r>
-              <a:rPr lang="en-SG" sz="2000" dirty="0">
-                <a:latin typeface="Cambria" panose="02040503050406030204" pitchFamily="18" charset="0"/>
-                <a:ea typeface="Cambria" panose="02040503050406030204" pitchFamily="18" charset="0"/>
-              </a:rPr>
-              <a:t>Sum of Discount Price</a:t>
-            </a:r>
-          </a:p>
-          <a:p>
-            <a:pPr marL="342900" indent="-342900">
-              <a:buFont typeface="Arial" panose="020B0604020202020204" pitchFamily="34" charset="0"/>
-              <a:buChar char="•"/>
-            </a:pPr>
-            <a:r>
-              <a:rPr lang="en-SG" sz="2000" dirty="0">
-                <a:latin typeface="Cambria" panose="02040503050406030204" pitchFamily="18" charset="0"/>
-                <a:ea typeface="Cambria" panose="02040503050406030204" pitchFamily="18" charset="0"/>
-              </a:rPr>
-              <a:t>Sum of Discount%</a:t>
-            </a:r>
-          </a:p>
-        </p:txBody>
-      </p:sp>
     </p:spTree>
     <p:extLst>
       <p:ext uri="{BB962C8B-B14F-4D97-AF65-F5344CB8AC3E}">
@@ -5507,12 +5507,247 @@
           <a:chExt cx="0" cy="0"/>
         </a:xfrm>
       </p:grpSpPr>
+      <p:sp>
+        <p:nvSpPr>
+          <p:cNvPr id="11" name="TextBox 10">
+            <a:extLst>
+              <a:ext uri="{FF2B5EF4-FFF2-40B4-BE49-F238E27FC236}">
+                <a16:creationId xmlns:a16="http://schemas.microsoft.com/office/drawing/2014/main" id="{4A67F49E-A5A6-0DC6-DD2B-A3744936FA5D}"/>
+              </a:ext>
+            </a:extLst>
+          </p:cNvPr>
+          <p:cNvSpPr txBox="1"/>
+          <p:nvPr/>
+        </p:nvSpPr>
+        <p:spPr>
+          <a:xfrm>
+            <a:off x="218090" y="31531"/>
+            <a:ext cx="10708395" cy="430887"/>
+          </a:xfrm>
+          <a:prstGeom prst="rect">
+            <a:avLst/>
+          </a:prstGeom>
+          <a:noFill/>
+        </p:spPr>
+        <p:txBody>
+          <a:bodyPr wrap="square" rtlCol="0">
+            <a:spAutoFit/>
+          </a:bodyPr>
+          <a:lstStyle/>
+          <a:p>
+            <a:r>
+              <a:rPr lang="en-SG" sz="2200" b="1" dirty="0">
+                <a:latin typeface="Cambria" panose="02040503050406030204" pitchFamily="18" charset="0"/>
+                <a:ea typeface="Cambria" panose="02040503050406030204" pitchFamily="18" charset="0"/>
+              </a:rPr>
+              <a:t>Price, Discount Price And Discount Percentage Review</a:t>
+            </a:r>
+          </a:p>
+        </p:txBody>
+      </p:sp>
+      <p:sp>
+        <p:nvSpPr>
+          <p:cNvPr id="12" name="TextBox 11">
+            <a:extLst>
+              <a:ext uri="{FF2B5EF4-FFF2-40B4-BE49-F238E27FC236}">
+                <a16:creationId xmlns:a16="http://schemas.microsoft.com/office/drawing/2014/main" id="{01EB6C3D-493A-C413-7715-FD28384F24E9}"/>
+              </a:ext>
+            </a:extLst>
+          </p:cNvPr>
+          <p:cNvSpPr txBox="1"/>
+          <p:nvPr/>
+        </p:nvSpPr>
+        <p:spPr>
+          <a:xfrm>
+            <a:off x="218090" y="618272"/>
+            <a:ext cx="11553496" cy="707886"/>
+          </a:xfrm>
+          <a:prstGeom prst="rect">
+            <a:avLst/>
+          </a:prstGeom>
+          <a:noFill/>
+        </p:spPr>
+        <p:txBody>
+          <a:bodyPr wrap="square" rtlCol="0">
+            <a:spAutoFit/>
+          </a:bodyPr>
+          <a:lstStyle/>
+          <a:p>
+            <a:r>
+              <a:rPr lang="en-US" sz="2000" dirty="0">
+                <a:latin typeface="Cambria" panose="02040503050406030204" pitchFamily="18" charset="0"/>
+                <a:ea typeface="Cambria" panose="02040503050406030204" pitchFamily="18" charset="0"/>
+              </a:rPr>
+              <a:t>This chart is like a map of Amazon products. It helps us understand how much different products cost, how much they cost after a discount, and how many people liked them.</a:t>
+            </a:r>
+          </a:p>
+        </p:txBody>
+      </p:sp>
+      <p:sp>
+        <p:nvSpPr>
+          <p:cNvPr id="13" name="TextBox 12">
+            <a:extLst>
+              <a:ext uri="{FF2B5EF4-FFF2-40B4-BE49-F238E27FC236}">
+                <a16:creationId xmlns:a16="http://schemas.microsoft.com/office/drawing/2014/main" id="{C06FDEB5-938F-3210-162D-B023952E7425}"/>
+              </a:ext>
+            </a:extLst>
+          </p:cNvPr>
+          <p:cNvSpPr txBox="1"/>
+          <p:nvPr/>
+        </p:nvSpPr>
+        <p:spPr>
+          <a:xfrm>
+            <a:off x="218090" y="5464389"/>
+            <a:ext cx="11698204" cy="1323439"/>
+          </a:xfrm>
+          <a:prstGeom prst="rect">
+            <a:avLst/>
+          </a:prstGeom>
+          <a:noFill/>
+        </p:spPr>
+        <p:txBody>
+          <a:bodyPr wrap="square" rtlCol="0">
+            <a:spAutoFit/>
+          </a:bodyPr>
+          <a:lstStyle/>
+          <a:p>
+            <a:pPr algn="just"/>
+            <a:r>
+              <a:rPr lang="en-US" sz="2000" b="1" dirty="0">
+                <a:latin typeface="Cambria" panose="02040503050406030204" pitchFamily="18" charset="0"/>
+                <a:ea typeface="Cambria" panose="02040503050406030204" pitchFamily="18" charset="0"/>
+              </a:rPr>
+              <a:t>Summary:</a:t>
+            </a:r>
+            <a:endParaRPr lang="en-US" sz="2000" dirty="0">
+              <a:latin typeface="Cambria" panose="02040503050406030204" pitchFamily="18" charset="0"/>
+              <a:ea typeface="Cambria" panose="02040503050406030204" pitchFamily="18" charset="0"/>
+            </a:endParaRPr>
+          </a:p>
+          <a:p>
+            <a:pPr algn="just"/>
+            <a:r>
+              <a:rPr lang="en-US" sz="2000" dirty="0">
+                <a:latin typeface="Cambria" panose="02040503050406030204" pitchFamily="18" charset="0"/>
+                <a:ea typeface="Cambria" panose="02040503050406030204" pitchFamily="18" charset="0"/>
+              </a:rPr>
+              <a:t>The chart helps us understand that Amazon has a lot of products with different prices and discounts. We can see which categories have the most expensive products and which categories have the highest discounts. We can also see how many people have rated products on Amazon.</a:t>
+            </a:r>
+            <a:endParaRPr lang="en-SG" sz="2000" dirty="0">
+              <a:latin typeface="Cambria" panose="02040503050406030204" pitchFamily="18" charset="0"/>
+              <a:ea typeface="Cambria" panose="02040503050406030204" pitchFamily="18" charset="0"/>
+            </a:endParaRPr>
+          </a:p>
+        </p:txBody>
+      </p:sp>
+      <p:sp>
+        <p:nvSpPr>
+          <p:cNvPr id="14" name="TextBox 13">
+            <a:extLst>
+              <a:ext uri="{FF2B5EF4-FFF2-40B4-BE49-F238E27FC236}">
+                <a16:creationId xmlns:a16="http://schemas.microsoft.com/office/drawing/2014/main" id="{50A1D1A6-4FF2-848F-B1A2-0B5C06828784}"/>
+              </a:ext>
+            </a:extLst>
+          </p:cNvPr>
+          <p:cNvSpPr txBox="1"/>
+          <p:nvPr/>
+        </p:nvSpPr>
+        <p:spPr>
+          <a:xfrm>
+            <a:off x="136634" y="1912936"/>
+            <a:ext cx="6463863" cy="2246769"/>
+          </a:xfrm>
+          <a:prstGeom prst="rect">
+            <a:avLst/>
+          </a:prstGeom>
+          <a:noFill/>
+        </p:spPr>
+        <p:txBody>
+          <a:bodyPr wrap="square" rtlCol="0">
+            <a:spAutoFit/>
+          </a:bodyPr>
+          <a:lstStyle/>
+          <a:p>
+            <a:r>
+              <a:rPr lang="en-US" sz="2000" b="1" dirty="0">
+                <a:latin typeface="Cambria" panose="02040503050406030204" pitchFamily="18" charset="0"/>
+                <a:ea typeface="Cambria" panose="02040503050406030204" pitchFamily="18" charset="0"/>
+              </a:rPr>
+              <a:t>Let's explore each part:</a:t>
+            </a:r>
+            <a:endParaRPr lang="en-US" sz="2000" dirty="0">
+              <a:latin typeface="Cambria" panose="02040503050406030204" pitchFamily="18" charset="0"/>
+              <a:ea typeface="Cambria" panose="02040503050406030204" pitchFamily="18" charset="0"/>
+            </a:endParaRPr>
+          </a:p>
+          <a:p>
+            <a:pPr marL="342900" indent="-342900" algn="just">
+              <a:buFont typeface="Arial" panose="020B0604020202020204" pitchFamily="34" charset="0"/>
+              <a:buChar char="•"/>
+            </a:pPr>
+            <a:r>
+              <a:rPr lang="en-US" sz="2000" dirty="0">
+                <a:latin typeface="Cambria" panose="02040503050406030204" pitchFamily="18" charset="0"/>
+                <a:ea typeface="Cambria" panose="02040503050406030204" pitchFamily="18" charset="0"/>
+              </a:rPr>
+              <a:t>Sum of Actual Price, Sum of Discount Price, Sum of Discount%, and Count of Ratings</a:t>
+            </a:r>
+          </a:p>
+          <a:p>
+            <a:pPr marL="342900" indent="-342900" algn="just">
+              <a:buFont typeface="Arial" panose="020B0604020202020204" pitchFamily="34" charset="0"/>
+              <a:buChar char="•"/>
+            </a:pPr>
+            <a:r>
+              <a:rPr lang="en-US" sz="2000" dirty="0">
+                <a:latin typeface="Cambria" panose="02040503050406030204" pitchFamily="18" charset="0"/>
+                <a:ea typeface="Cambria" panose="02040503050406030204" pitchFamily="18" charset="0"/>
+              </a:rPr>
+              <a:t>Sum of Actual Price and Count of Sub-Category by Category</a:t>
+            </a:r>
+            <a:endParaRPr lang="en-US" sz="2000" b="1" dirty="0">
+              <a:latin typeface="Cambria" panose="02040503050406030204" pitchFamily="18" charset="0"/>
+              <a:ea typeface="Cambria" panose="02040503050406030204" pitchFamily="18" charset="0"/>
+            </a:endParaRPr>
+          </a:p>
+          <a:p>
+            <a:pPr marL="342900" indent="-342900" algn="just">
+              <a:buFont typeface="Arial" panose="020B0604020202020204" pitchFamily="34" charset="0"/>
+              <a:buChar char="•"/>
+            </a:pPr>
+            <a:r>
+              <a:rPr lang="en-US" sz="2000" dirty="0">
+                <a:latin typeface="Cambria" panose="02040503050406030204" pitchFamily="18" charset="0"/>
+                <a:ea typeface="Cambria" panose="02040503050406030204" pitchFamily="18" charset="0"/>
+              </a:rPr>
+              <a:t>Sum of Discount Price by Category and Sub-Category</a:t>
+            </a:r>
+            <a:endParaRPr lang="en-US" sz="2000" b="1" dirty="0">
+              <a:latin typeface="Cambria" panose="02040503050406030204" pitchFamily="18" charset="0"/>
+              <a:ea typeface="Cambria" panose="02040503050406030204" pitchFamily="18" charset="0"/>
+            </a:endParaRPr>
+          </a:p>
+          <a:p>
+            <a:pPr marL="342900" indent="-342900" algn="just">
+              <a:buFont typeface="Arial" panose="020B0604020202020204" pitchFamily="34" charset="0"/>
+              <a:buChar char="•"/>
+            </a:pPr>
+            <a:r>
+              <a:rPr lang="en-US" sz="2000" dirty="0">
+                <a:latin typeface="Cambria" panose="02040503050406030204" pitchFamily="18" charset="0"/>
+                <a:ea typeface="Cambria" panose="02040503050406030204" pitchFamily="18" charset="0"/>
+              </a:rPr>
+              <a:t>Sum of Discount% by Category and Sub-Category</a:t>
+            </a:r>
+          </a:p>
+        </p:txBody>
+      </p:sp>
       <p:pic>
         <p:nvPicPr>
-          <p:cNvPr id="5" name="Picture 4">
-            <a:extLst>
-              <a:ext uri="{FF2B5EF4-FFF2-40B4-BE49-F238E27FC236}">
-                <a16:creationId xmlns:a16="http://schemas.microsoft.com/office/drawing/2014/main" id="{20DA8BF5-AA9B-54E1-DDC2-AFC2EBF6DE8A}"/>
+          <p:cNvPr id="3" name="Picture 2">
+            <a:extLst>
+              <a:ext uri="{FF2B5EF4-FFF2-40B4-BE49-F238E27FC236}">
+                <a16:creationId xmlns:a16="http://schemas.microsoft.com/office/drawing/2014/main" id="{C008C5FB-0448-68A2-B9C3-76C79A74EF08}"/>
               </a:ext>
             </a:extLst>
           </p:cNvPr>
@@ -5529,249 +5764,14 @@
         </p:blipFill>
         <p:spPr>
           <a:xfrm>
-            <a:off x="6600497" y="1326158"/>
-            <a:ext cx="5494474" cy="4035074"/>
+            <a:off x="6716108" y="1553076"/>
+            <a:ext cx="5339258" cy="3941034"/>
           </a:xfrm>
           <a:prstGeom prst="rect">
             <a:avLst/>
           </a:prstGeom>
         </p:spPr>
       </p:pic>
-      <p:sp>
-        <p:nvSpPr>
-          <p:cNvPr id="11" name="TextBox 10">
-            <a:extLst>
-              <a:ext uri="{FF2B5EF4-FFF2-40B4-BE49-F238E27FC236}">
-                <a16:creationId xmlns:a16="http://schemas.microsoft.com/office/drawing/2014/main" id="{4A67F49E-A5A6-0DC6-DD2B-A3744936FA5D}"/>
-              </a:ext>
-            </a:extLst>
-          </p:cNvPr>
-          <p:cNvSpPr txBox="1"/>
-          <p:nvPr/>
-        </p:nvSpPr>
-        <p:spPr>
-          <a:xfrm>
-            <a:off x="218090" y="31531"/>
-            <a:ext cx="10708395" cy="430887"/>
-          </a:xfrm>
-          <a:prstGeom prst="rect">
-            <a:avLst/>
-          </a:prstGeom>
-          <a:noFill/>
-        </p:spPr>
-        <p:txBody>
-          <a:bodyPr wrap="square" rtlCol="0">
-            <a:spAutoFit/>
-          </a:bodyPr>
-          <a:lstStyle/>
-          <a:p>
-            <a:r>
-              <a:rPr lang="en-SG" sz="2200" b="1" dirty="0">
-                <a:latin typeface="Cambria" panose="02040503050406030204" pitchFamily="18" charset="0"/>
-                <a:ea typeface="Cambria" panose="02040503050406030204" pitchFamily="18" charset="0"/>
-              </a:rPr>
-              <a:t>Price, Discount Price And Discount Percentage Review</a:t>
-            </a:r>
-          </a:p>
-        </p:txBody>
-      </p:sp>
-      <p:sp>
-        <p:nvSpPr>
-          <p:cNvPr id="12" name="TextBox 11">
-            <a:extLst>
-              <a:ext uri="{FF2B5EF4-FFF2-40B4-BE49-F238E27FC236}">
-                <a16:creationId xmlns:a16="http://schemas.microsoft.com/office/drawing/2014/main" id="{01EB6C3D-493A-C413-7715-FD28384F24E9}"/>
-              </a:ext>
-            </a:extLst>
-          </p:cNvPr>
-          <p:cNvSpPr txBox="1"/>
-          <p:nvPr/>
-        </p:nvSpPr>
-        <p:spPr>
-          <a:xfrm>
-            <a:off x="218090" y="618272"/>
-            <a:ext cx="11553496" cy="707886"/>
-          </a:xfrm>
-          <a:prstGeom prst="rect">
-            <a:avLst/>
-          </a:prstGeom>
-          <a:noFill/>
-        </p:spPr>
-        <p:txBody>
-          <a:bodyPr wrap="square" rtlCol="0">
-            <a:spAutoFit/>
-          </a:bodyPr>
-          <a:lstStyle/>
-          <a:p>
-            <a:r>
-              <a:rPr lang="en-US" sz="2000" dirty="0">
-                <a:latin typeface="Cambria" panose="02040503050406030204" pitchFamily="18" charset="0"/>
-                <a:ea typeface="Cambria" panose="02040503050406030204" pitchFamily="18" charset="0"/>
-              </a:rPr>
-              <a:t>This chart is like a map of Amazon products. It helps us understand how much different products cost, how much they cost after a discount, and how many people liked them.</a:t>
-            </a:r>
-          </a:p>
-        </p:txBody>
-      </p:sp>
-      <p:sp>
-        <p:nvSpPr>
-          <p:cNvPr id="13" name="TextBox 12">
-            <a:extLst>
-              <a:ext uri="{FF2B5EF4-FFF2-40B4-BE49-F238E27FC236}">
-                <a16:creationId xmlns:a16="http://schemas.microsoft.com/office/drawing/2014/main" id="{C06FDEB5-938F-3210-162D-B023952E7425}"/>
-              </a:ext>
-            </a:extLst>
-          </p:cNvPr>
-          <p:cNvSpPr txBox="1"/>
-          <p:nvPr/>
-        </p:nvSpPr>
-        <p:spPr>
-          <a:xfrm>
-            <a:off x="218090" y="5464389"/>
-            <a:ext cx="11698204" cy="1323439"/>
-          </a:xfrm>
-          <a:prstGeom prst="rect">
-            <a:avLst/>
-          </a:prstGeom>
-          <a:noFill/>
-        </p:spPr>
-        <p:txBody>
-          <a:bodyPr wrap="square" rtlCol="0">
-            <a:spAutoFit/>
-          </a:bodyPr>
-          <a:lstStyle/>
-          <a:p>
-            <a:pPr algn="just"/>
-            <a:r>
-              <a:rPr lang="en-US" sz="2000" b="1" dirty="0">
-                <a:latin typeface="Cambria" panose="02040503050406030204" pitchFamily="18" charset="0"/>
-                <a:ea typeface="Cambria" panose="02040503050406030204" pitchFamily="18" charset="0"/>
-              </a:rPr>
-              <a:t>Summary:</a:t>
-            </a:r>
-            <a:endParaRPr lang="en-US" sz="2000" dirty="0">
-              <a:latin typeface="Cambria" panose="02040503050406030204" pitchFamily="18" charset="0"/>
-              <a:ea typeface="Cambria" panose="02040503050406030204" pitchFamily="18" charset="0"/>
-            </a:endParaRPr>
-          </a:p>
-          <a:p>
-            <a:pPr algn="just"/>
-            <a:r>
-              <a:rPr lang="en-US" sz="2000" dirty="0">
-                <a:latin typeface="Cambria" panose="02040503050406030204" pitchFamily="18" charset="0"/>
-                <a:ea typeface="Cambria" panose="02040503050406030204" pitchFamily="18" charset="0"/>
-              </a:rPr>
-              <a:t>The chart helps us understand that Amazon has a lot of products with different prices and discounts. We can see which categories have the most expensive products and which categories have the highest discounts. We can also see how many people have rated products on Amazon.</a:t>
-            </a:r>
-            <a:endParaRPr lang="en-SG" sz="2000" dirty="0">
-              <a:latin typeface="Cambria" panose="02040503050406030204" pitchFamily="18" charset="0"/>
-              <a:ea typeface="Cambria" panose="02040503050406030204" pitchFamily="18" charset="0"/>
-            </a:endParaRPr>
-          </a:p>
-        </p:txBody>
-      </p:sp>
-      <p:sp>
-        <p:nvSpPr>
-          <p:cNvPr id="14" name="TextBox 13">
-            <a:extLst>
-              <a:ext uri="{FF2B5EF4-FFF2-40B4-BE49-F238E27FC236}">
-                <a16:creationId xmlns:a16="http://schemas.microsoft.com/office/drawing/2014/main" id="{50A1D1A6-4FF2-848F-B1A2-0B5C06828784}"/>
-              </a:ext>
-            </a:extLst>
-          </p:cNvPr>
-          <p:cNvSpPr txBox="1"/>
-          <p:nvPr/>
-        </p:nvSpPr>
-        <p:spPr>
-          <a:xfrm>
-            <a:off x="136634" y="1912936"/>
-            <a:ext cx="6463863" cy="2246769"/>
-          </a:xfrm>
-          <a:prstGeom prst="rect">
-            <a:avLst/>
-          </a:prstGeom>
-          <a:noFill/>
-        </p:spPr>
-        <p:txBody>
-          <a:bodyPr wrap="square" rtlCol="0">
-            <a:spAutoFit/>
-          </a:bodyPr>
-          <a:lstStyle/>
-          <a:p>
-            <a:r>
-              <a:rPr lang="en-US" sz="2000" b="1" dirty="0">
-                <a:latin typeface="Cambria" panose="02040503050406030204" pitchFamily="18" charset="0"/>
-                <a:ea typeface="Cambria" panose="02040503050406030204" pitchFamily="18" charset="0"/>
-              </a:rPr>
-              <a:t>Let's explore each part:</a:t>
-            </a:r>
-            <a:endParaRPr lang="en-US" sz="2000" dirty="0">
-              <a:latin typeface="Cambria" panose="02040503050406030204" pitchFamily="18" charset="0"/>
-              <a:ea typeface="Cambria" panose="02040503050406030204" pitchFamily="18" charset="0"/>
-            </a:endParaRPr>
-          </a:p>
-          <a:p>
-            <a:pPr marL="342900" indent="-342900" algn="just">
-              <a:buFont typeface="Arial" panose="020B0604020202020204" pitchFamily="34" charset="0"/>
-              <a:buChar char="•"/>
-            </a:pPr>
-            <a:r>
-              <a:rPr lang="en-US" sz="2000" dirty="0">
-                <a:latin typeface="Cambria" panose="02040503050406030204" pitchFamily="18" charset="0"/>
-                <a:ea typeface="Cambria" panose="02040503050406030204" pitchFamily="18" charset="0"/>
-              </a:rPr>
-              <a:t>Sum of Actual Price, Sum of Discount Price, Sum of Discount%, and Count of Ratings</a:t>
-            </a:r>
-          </a:p>
-          <a:p>
-            <a:pPr marL="342900" indent="-342900" algn="just">
-              <a:buFont typeface="Arial" panose="020B0604020202020204" pitchFamily="34" charset="0"/>
-              <a:buChar char="•"/>
-            </a:pPr>
-            <a:r>
-              <a:rPr lang="en-US" sz="2000" dirty="0">
-                <a:latin typeface="Cambria" panose="02040503050406030204" pitchFamily="18" charset="0"/>
-                <a:ea typeface="Cambria" panose="02040503050406030204" pitchFamily="18" charset="0"/>
-              </a:rPr>
-              <a:t>Sum of Actual Price and Count of Sub-Category by Category</a:t>
-            </a:r>
-            <a:endParaRPr lang="en-US" sz="2000" b="1" dirty="0">
-              <a:latin typeface="Cambria" panose="02040503050406030204" pitchFamily="18" charset="0"/>
-              <a:ea typeface="Cambria" panose="02040503050406030204" pitchFamily="18" charset="0"/>
-            </a:endParaRPr>
-          </a:p>
-          <a:p>
-            <a:pPr marL="342900" indent="-342900" algn="just">
-              <a:buFont typeface="Arial" panose="020B0604020202020204" pitchFamily="34" charset="0"/>
-              <a:buChar char="•"/>
-            </a:pPr>
-            <a:r>
-              <a:rPr lang="en-US" sz="2000" dirty="0">
-                <a:latin typeface="Cambria" panose="02040503050406030204" pitchFamily="18" charset="0"/>
-                <a:ea typeface="Cambria" panose="02040503050406030204" pitchFamily="18" charset="0"/>
-              </a:rPr>
-              <a:t>Sum of Discount Price by Category and Sub-Category</a:t>
-            </a:r>
-            <a:endParaRPr lang="en-US" sz="2000" b="1" dirty="0">
-              <a:latin typeface="Cambria" panose="02040503050406030204" pitchFamily="18" charset="0"/>
-              <a:ea typeface="Cambria" panose="02040503050406030204" pitchFamily="18" charset="0"/>
-            </a:endParaRPr>
-          </a:p>
-          <a:p>
-            <a:pPr marL="342900" indent="-342900" algn="just">
-              <a:buFont typeface="Arial" panose="020B0604020202020204" pitchFamily="34" charset="0"/>
-              <a:buChar char="•"/>
-            </a:pPr>
-            <a:r>
-              <a:rPr lang="en-US" sz="2000" dirty="0">
-                <a:latin typeface="Cambria" panose="02040503050406030204" pitchFamily="18" charset="0"/>
-                <a:ea typeface="Cambria" panose="02040503050406030204" pitchFamily="18" charset="0"/>
-              </a:rPr>
-              <a:t>Sum of Discount% by Category and Sub-Category</a:t>
-            </a:r>
-          </a:p>
-        </p:txBody>
-      </p:sp>
     </p:spTree>
     <p:extLst>
       <p:ext uri="{BB962C8B-B14F-4D97-AF65-F5344CB8AC3E}">
@@ -5802,12 +5802,218 @@
           <a:chExt cx="0" cy="0"/>
         </a:xfrm>
       </p:grpSpPr>
+      <p:sp>
+        <p:nvSpPr>
+          <p:cNvPr id="6" name="TextBox 5">
+            <a:extLst>
+              <a:ext uri="{FF2B5EF4-FFF2-40B4-BE49-F238E27FC236}">
+                <a16:creationId xmlns:a16="http://schemas.microsoft.com/office/drawing/2014/main" id="{38F1242A-042D-81C6-735E-6AA8E722243D}"/>
+              </a:ext>
+            </a:extLst>
+          </p:cNvPr>
+          <p:cNvSpPr txBox="1"/>
+          <p:nvPr/>
+        </p:nvSpPr>
+        <p:spPr>
+          <a:xfrm>
+            <a:off x="339687" y="206254"/>
+            <a:ext cx="11512626" cy="430887"/>
+          </a:xfrm>
+          <a:prstGeom prst="rect">
+            <a:avLst/>
+          </a:prstGeom>
+          <a:noFill/>
+        </p:spPr>
+        <p:txBody>
+          <a:bodyPr wrap="square" rtlCol="0">
+            <a:spAutoFit/>
+          </a:bodyPr>
+          <a:lstStyle/>
+          <a:p>
+            <a:r>
+              <a:rPr lang="en-US" sz="2200" b="1" dirty="0">
+                <a:latin typeface="Cambria" panose="02040503050406030204" pitchFamily="18" charset="0"/>
+                <a:ea typeface="Cambria" panose="02040503050406030204" pitchFamily="18" charset="0"/>
+              </a:rPr>
+              <a:t>Top and Bottom 10 Product Categories by Price, Discount, and Rating</a:t>
+            </a:r>
+            <a:endParaRPr lang="en-SG" sz="2200" b="1" dirty="0">
+              <a:latin typeface="Cambria" panose="02040503050406030204" pitchFamily="18" charset="0"/>
+              <a:ea typeface="Cambria" panose="02040503050406030204" pitchFamily="18" charset="0"/>
+            </a:endParaRPr>
+          </a:p>
+        </p:txBody>
+      </p:sp>
+      <p:sp>
+        <p:nvSpPr>
+          <p:cNvPr id="8" name="TextBox 7">
+            <a:extLst>
+              <a:ext uri="{FF2B5EF4-FFF2-40B4-BE49-F238E27FC236}">
+                <a16:creationId xmlns:a16="http://schemas.microsoft.com/office/drawing/2014/main" id="{6A151DF6-0E8E-0544-2F2D-183C6AC7DE19}"/>
+              </a:ext>
+            </a:extLst>
+          </p:cNvPr>
+          <p:cNvSpPr txBox="1"/>
+          <p:nvPr/>
+        </p:nvSpPr>
+        <p:spPr>
+          <a:xfrm>
+            <a:off x="339687" y="725669"/>
+            <a:ext cx="11512624" cy="707886"/>
+          </a:xfrm>
+          <a:prstGeom prst="rect">
+            <a:avLst/>
+          </a:prstGeom>
+          <a:noFill/>
+        </p:spPr>
+        <p:txBody>
+          <a:bodyPr wrap="square" rtlCol="0">
+            <a:spAutoFit/>
+          </a:bodyPr>
+          <a:lstStyle/>
+          <a:p>
+            <a:r>
+              <a:rPr lang="en-US" sz="2000" dirty="0">
+                <a:latin typeface="Cambria" panose="02040503050406030204" pitchFamily="18" charset="0"/>
+                <a:ea typeface="Cambria" panose="02040503050406030204" pitchFamily="18" charset="0"/>
+              </a:rPr>
+              <a:t>This chart is like a map of Amazon products. It helps us understand which product categories are the most and least popular, expensive, and discounted.</a:t>
+            </a:r>
+          </a:p>
+        </p:txBody>
+      </p:sp>
+      <p:sp>
+        <p:nvSpPr>
+          <p:cNvPr id="9" name="TextBox 8">
+            <a:extLst>
+              <a:ext uri="{FF2B5EF4-FFF2-40B4-BE49-F238E27FC236}">
+                <a16:creationId xmlns:a16="http://schemas.microsoft.com/office/drawing/2014/main" id="{487E692D-8ECE-F8D6-7666-7A7FA7A142C1}"/>
+              </a:ext>
+            </a:extLst>
+          </p:cNvPr>
+          <p:cNvSpPr txBox="1"/>
+          <p:nvPr/>
+        </p:nvSpPr>
+        <p:spPr>
+          <a:xfrm>
+            <a:off x="339686" y="5473591"/>
+            <a:ext cx="11512625" cy="1323439"/>
+          </a:xfrm>
+          <a:prstGeom prst="rect">
+            <a:avLst/>
+          </a:prstGeom>
+          <a:noFill/>
+        </p:spPr>
+        <p:txBody>
+          <a:bodyPr wrap="square" rtlCol="0">
+            <a:spAutoFit/>
+          </a:bodyPr>
+          <a:lstStyle/>
+          <a:p>
+            <a:pPr algn="just"/>
+            <a:r>
+              <a:rPr lang="en-US" sz="2000" b="1" dirty="0">
+                <a:latin typeface="Cambria" panose="02040503050406030204" pitchFamily="18" charset="0"/>
+                <a:ea typeface="Cambria" panose="02040503050406030204" pitchFamily="18" charset="0"/>
+              </a:rPr>
+              <a:t>Summary:</a:t>
+            </a:r>
+            <a:endParaRPr lang="en-US" sz="2000" dirty="0">
+              <a:latin typeface="Cambria" panose="02040503050406030204" pitchFamily="18" charset="0"/>
+              <a:ea typeface="Cambria" panose="02040503050406030204" pitchFamily="18" charset="0"/>
+            </a:endParaRPr>
+          </a:p>
+          <a:p>
+            <a:pPr algn="just"/>
+            <a:r>
+              <a:rPr lang="en-US" sz="2000" dirty="0">
+                <a:latin typeface="Cambria" panose="02040503050406030204" pitchFamily="18" charset="0"/>
+                <a:ea typeface="Cambria" panose="02040503050406030204" pitchFamily="18" charset="0"/>
+              </a:rPr>
+              <a:t>The chart helps us understand that Amazon has a wide variety of products in different categories. We can see which categories are the most and least popular, expensive, and discounted. This information can help us choose which products to buy on Amazon.</a:t>
+            </a:r>
+            <a:endParaRPr lang="en-SG" sz="2000" dirty="0">
+              <a:latin typeface="Cambria" panose="02040503050406030204" pitchFamily="18" charset="0"/>
+              <a:ea typeface="Cambria" panose="02040503050406030204" pitchFamily="18" charset="0"/>
+            </a:endParaRPr>
+          </a:p>
+        </p:txBody>
+      </p:sp>
+      <p:sp>
+        <p:nvSpPr>
+          <p:cNvPr id="11" name="TextBox 10">
+            <a:extLst>
+              <a:ext uri="{FF2B5EF4-FFF2-40B4-BE49-F238E27FC236}">
+                <a16:creationId xmlns:a16="http://schemas.microsoft.com/office/drawing/2014/main" id="{BC5A2379-6DD4-7206-A644-B14306035BF9}"/>
+              </a:ext>
+            </a:extLst>
+          </p:cNvPr>
+          <p:cNvSpPr txBox="1"/>
+          <p:nvPr/>
+        </p:nvSpPr>
+        <p:spPr>
+          <a:xfrm>
+            <a:off x="339686" y="1684575"/>
+            <a:ext cx="4568644" cy="2246769"/>
+          </a:xfrm>
+          <a:prstGeom prst="rect">
+            <a:avLst/>
+          </a:prstGeom>
+          <a:noFill/>
+        </p:spPr>
+        <p:txBody>
+          <a:bodyPr wrap="square" rtlCol="0">
+            <a:spAutoFit/>
+          </a:bodyPr>
+          <a:lstStyle/>
+          <a:p>
+            <a:pPr algn="just"/>
+            <a:r>
+              <a:rPr lang="en-US" sz="2000" b="1" dirty="0">
+                <a:latin typeface="Cambria" panose="02040503050406030204" pitchFamily="18" charset="0"/>
+                <a:ea typeface="Cambria" panose="02040503050406030204" pitchFamily="18" charset="0"/>
+              </a:rPr>
+              <a:t>It will explore each part:</a:t>
+            </a:r>
+            <a:endParaRPr lang="en-US" sz="2000" dirty="0">
+              <a:latin typeface="Cambria" panose="02040503050406030204" pitchFamily="18" charset="0"/>
+              <a:ea typeface="Cambria" panose="02040503050406030204" pitchFamily="18" charset="0"/>
+            </a:endParaRPr>
+          </a:p>
+          <a:p>
+            <a:pPr marL="285750" indent="-285750" algn="just">
+              <a:buFont typeface="Arial" panose="020B0604020202020204" pitchFamily="34" charset="0"/>
+              <a:buChar char="•"/>
+            </a:pPr>
+            <a:r>
+              <a:rPr lang="en-US" sz="2000" dirty="0">
+                <a:latin typeface="Cambria" panose="02040503050406030204" pitchFamily="18" charset="0"/>
+                <a:ea typeface="Cambria" panose="02040503050406030204" pitchFamily="18" charset="0"/>
+              </a:rPr>
+              <a:t>Top 10 Sum of Actual Price, Sum of Discount Price and Sum of Ratings by Category</a:t>
+            </a:r>
+          </a:p>
+          <a:p>
+            <a:pPr marL="285750" indent="-285750" algn="just">
+              <a:buFont typeface="Arial" panose="020B0604020202020204" pitchFamily="34" charset="0"/>
+              <a:buChar char="•"/>
+            </a:pPr>
+            <a:r>
+              <a:rPr lang="en-US" sz="2000" dirty="0">
+                <a:latin typeface="Cambria" panose="02040503050406030204" pitchFamily="18" charset="0"/>
+                <a:ea typeface="Cambria" panose="02040503050406030204" pitchFamily="18" charset="0"/>
+              </a:rPr>
+              <a:t>Bottom 10 Sum of Actual Price, Sum of Discount Price and Sum of Ratings by Category</a:t>
+            </a:r>
+          </a:p>
+        </p:txBody>
+      </p:sp>
       <p:pic>
         <p:nvPicPr>
-          <p:cNvPr id="5" name="Picture 4">
-            <a:extLst>
-              <a:ext uri="{FF2B5EF4-FFF2-40B4-BE49-F238E27FC236}">
-                <a16:creationId xmlns:a16="http://schemas.microsoft.com/office/drawing/2014/main" id="{D54A52D5-9781-F0D8-E632-74B1D01C5DF9}"/>
+          <p:cNvPr id="3" name="Picture 2">
+            <a:extLst>
+              <a:ext uri="{FF2B5EF4-FFF2-40B4-BE49-F238E27FC236}">
+                <a16:creationId xmlns:a16="http://schemas.microsoft.com/office/drawing/2014/main" id="{7B261DC7-197D-7974-AB0F-57FBE011198A}"/>
               </a:ext>
             </a:extLst>
           </p:cNvPr>
@@ -5824,220 +6030,14 @@
         </p:blipFill>
         <p:spPr>
           <a:xfrm>
-            <a:off x="5073263" y="1522083"/>
-            <a:ext cx="6779048" cy="3862980"/>
+            <a:off x="5011626" y="1433555"/>
+            <a:ext cx="7054250" cy="3990890"/>
           </a:xfrm>
           <a:prstGeom prst="rect">
             <a:avLst/>
           </a:prstGeom>
         </p:spPr>
       </p:pic>
-      <p:sp>
-        <p:nvSpPr>
-          <p:cNvPr id="6" name="TextBox 5">
-            <a:extLst>
-              <a:ext uri="{FF2B5EF4-FFF2-40B4-BE49-F238E27FC236}">
-                <a16:creationId xmlns:a16="http://schemas.microsoft.com/office/drawing/2014/main" id="{38F1242A-042D-81C6-735E-6AA8E722243D}"/>
-              </a:ext>
-            </a:extLst>
-          </p:cNvPr>
-          <p:cNvSpPr txBox="1"/>
-          <p:nvPr/>
-        </p:nvSpPr>
-        <p:spPr>
-          <a:xfrm>
-            <a:off x="339687" y="206254"/>
-            <a:ext cx="11512626" cy="430887"/>
-          </a:xfrm>
-          <a:prstGeom prst="rect">
-            <a:avLst/>
-          </a:prstGeom>
-          <a:noFill/>
-        </p:spPr>
-        <p:txBody>
-          <a:bodyPr wrap="square" rtlCol="0">
-            <a:spAutoFit/>
-          </a:bodyPr>
-          <a:lstStyle/>
-          <a:p>
-            <a:r>
-              <a:rPr lang="en-US" sz="2200" b="1" dirty="0">
-                <a:latin typeface="Cambria" panose="02040503050406030204" pitchFamily="18" charset="0"/>
-                <a:ea typeface="Cambria" panose="02040503050406030204" pitchFamily="18" charset="0"/>
-              </a:rPr>
-              <a:t>Top and Bottom 10 Product Categories by Price, Discount, and Rating</a:t>
-            </a:r>
-            <a:endParaRPr lang="en-SG" sz="2200" b="1" dirty="0">
-              <a:latin typeface="Cambria" panose="02040503050406030204" pitchFamily="18" charset="0"/>
-              <a:ea typeface="Cambria" panose="02040503050406030204" pitchFamily="18" charset="0"/>
-            </a:endParaRPr>
-          </a:p>
-        </p:txBody>
-      </p:sp>
-      <p:sp>
-        <p:nvSpPr>
-          <p:cNvPr id="8" name="TextBox 7">
-            <a:extLst>
-              <a:ext uri="{FF2B5EF4-FFF2-40B4-BE49-F238E27FC236}">
-                <a16:creationId xmlns:a16="http://schemas.microsoft.com/office/drawing/2014/main" id="{6A151DF6-0E8E-0544-2F2D-183C6AC7DE19}"/>
-              </a:ext>
-            </a:extLst>
-          </p:cNvPr>
-          <p:cNvSpPr txBox="1"/>
-          <p:nvPr/>
-        </p:nvSpPr>
-        <p:spPr>
-          <a:xfrm>
-            <a:off x="339687" y="725669"/>
-            <a:ext cx="11512624" cy="707886"/>
-          </a:xfrm>
-          <a:prstGeom prst="rect">
-            <a:avLst/>
-          </a:prstGeom>
-          <a:noFill/>
-        </p:spPr>
-        <p:txBody>
-          <a:bodyPr wrap="square" rtlCol="0">
-            <a:spAutoFit/>
-          </a:bodyPr>
-          <a:lstStyle/>
-          <a:p>
-            <a:r>
-              <a:rPr lang="en-US" sz="2000" dirty="0">
-                <a:latin typeface="Cambria" panose="02040503050406030204" pitchFamily="18" charset="0"/>
-                <a:ea typeface="Cambria" panose="02040503050406030204" pitchFamily="18" charset="0"/>
-              </a:rPr>
-              <a:t>This chart is like a map of Amazon products. It helps us understand which product categories are the most and least popular, expensive, and discounted.</a:t>
-            </a:r>
-          </a:p>
-        </p:txBody>
-      </p:sp>
-      <p:sp>
-        <p:nvSpPr>
-          <p:cNvPr id="9" name="TextBox 8">
-            <a:extLst>
-              <a:ext uri="{FF2B5EF4-FFF2-40B4-BE49-F238E27FC236}">
-                <a16:creationId xmlns:a16="http://schemas.microsoft.com/office/drawing/2014/main" id="{487E692D-8ECE-F8D6-7666-7A7FA7A142C1}"/>
-              </a:ext>
-            </a:extLst>
-          </p:cNvPr>
-          <p:cNvSpPr txBox="1"/>
-          <p:nvPr/>
-        </p:nvSpPr>
-        <p:spPr>
-          <a:xfrm>
-            <a:off x="339686" y="5473591"/>
-            <a:ext cx="11512625" cy="1323439"/>
-          </a:xfrm>
-          <a:prstGeom prst="rect">
-            <a:avLst/>
-          </a:prstGeom>
-          <a:noFill/>
-        </p:spPr>
-        <p:txBody>
-          <a:bodyPr wrap="square" rtlCol="0">
-            <a:spAutoFit/>
-          </a:bodyPr>
-          <a:lstStyle/>
-          <a:p>
-            <a:pPr algn="just"/>
-            <a:r>
-              <a:rPr lang="en-US" sz="2000" b="1" dirty="0">
-                <a:latin typeface="Cambria" panose="02040503050406030204" pitchFamily="18" charset="0"/>
-                <a:ea typeface="Cambria" panose="02040503050406030204" pitchFamily="18" charset="0"/>
-              </a:rPr>
-              <a:t>Summary:</a:t>
-            </a:r>
-            <a:endParaRPr lang="en-US" sz="2000" dirty="0">
-              <a:latin typeface="Cambria" panose="02040503050406030204" pitchFamily="18" charset="0"/>
-              <a:ea typeface="Cambria" panose="02040503050406030204" pitchFamily="18" charset="0"/>
-            </a:endParaRPr>
-          </a:p>
-          <a:p>
-            <a:pPr algn="just"/>
-            <a:r>
-              <a:rPr lang="en-US" sz="2000" dirty="0">
-                <a:latin typeface="Cambria" panose="02040503050406030204" pitchFamily="18" charset="0"/>
-                <a:ea typeface="Cambria" panose="02040503050406030204" pitchFamily="18" charset="0"/>
-              </a:rPr>
-              <a:t>The chart helps us understand that Amazon has a wide variety of products in different categories. We can see which categories are the most and least popular, expensive, and discounted. This information can help us choose which products to buy on Amazon.</a:t>
-            </a:r>
-            <a:endParaRPr lang="en-SG" sz="2000" dirty="0">
-              <a:latin typeface="Cambria" panose="02040503050406030204" pitchFamily="18" charset="0"/>
-              <a:ea typeface="Cambria" panose="02040503050406030204" pitchFamily="18" charset="0"/>
-            </a:endParaRPr>
-          </a:p>
-        </p:txBody>
-      </p:sp>
-      <p:sp>
-        <p:nvSpPr>
-          <p:cNvPr id="11" name="TextBox 10">
-            <a:extLst>
-              <a:ext uri="{FF2B5EF4-FFF2-40B4-BE49-F238E27FC236}">
-                <a16:creationId xmlns:a16="http://schemas.microsoft.com/office/drawing/2014/main" id="{BC5A2379-6DD4-7206-A644-B14306035BF9}"/>
-              </a:ext>
-            </a:extLst>
-          </p:cNvPr>
-          <p:cNvSpPr txBox="1"/>
-          <p:nvPr/>
-        </p:nvSpPr>
-        <p:spPr>
-          <a:xfrm>
-            <a:off x="339686" y="1684575"/>
-            <a:ext cx="4568644" cy="2246769"/>
-          </a:xfrm>
-          <a:prstGeom prst="rect">
-            <a:avLst/>
-          </a:prstGeom>
-          <a:noFill/>
-        </p:spPr>
-        <p:txBody>
-          <a:bodyPr wrap="square" rtlCol="0">
-            <a:spAutoFit/>
-          </a:bodyPr>
-          <a:lstStyle/>
-          <a:p>
-            <a:pPr algn="just"/>
-            <a:r>
-              <a:rPr lang="en-US" sz="2000" b="1" dirty="0">
-                <a:latin typeface="Cambria" panose="02040503050406030204" pitchFamily="18" charset="0"/>
-                <a:ea typeface="Cambria" panose="02040503050406030204" pitchFamily="18" charset="0"/>
-              </a:rPr>
-              <a:t>It will explore each part:</a:t>
-            </a:r>
-            <a:endParaRPr lang="en-US" sz="2000" dirty="0">
-              <a:latin typeface="Cambria" panose="02040503050406030204" pitchFamily="18" charset="0"/>
-              <a:ea typeface="Cambria" panose="02040503050406030204" pitchFamily="18" charset="0"/>
-            </a:endParaRPr>
-          </a:p>
-          <a:p>
-            <a:pPr marL="285750" indent="-285750" algn="just">
-              <a:buFont typeface="Arial" panose="020B0604020202020204" pitchFamily="34" charset="0"/>
-              <a:buChar char="•"/>
-            </a:pPr>
-            <a:r>
-              <a:rPr lang="en-US" sz="2000" dirty="0">
-                <a:latin typeface="Cambria" panose="02040503050406030204" pitchFamily="18" charset="0"/>
-                <a:ea typeface="Cambria" panose="02040503050406030204" pitchFamily="18" charset="0"/>
-              </a:rPr>
-              <a:t>Top 10 Sum of Actual Price, Sum of Discount Price and Sum of Ratings by Category</a:t>
-            </a:r>
-          </a:p>
-          <a:p>
-            <a:pPr marL="285750" indent="-285750" algn="just">
-              <a:buFont typeface="Arial" panose="020B0604020202020204" pitchFamily="34" charset="0"/>
-              <a:buChar char="•"/>
-            </a:pPr>
-            <a:r>
-              <a:rPr lang="en-US" sz="2000" dirty="0">
-                <a:latin typeface="Cambria" panose="02040503050406030204" pitchFamily="18" charset="0"/>
-                <a:ea typeface="Cambria" panose="02040503050406030204" pitchFamily="18" charset="0"/>
-              </a:rPr>
-              <a:t>Bottom 10 Sum of Actual Price, Sum of Discount Price and Sum of Ratings by Category</a:t>
-            </a:r>
-          </a:p>
-        </p:txBody>
-      </p:sp>
     </p:spTree>
     <p:extLst>
       <p:ext uri="{BB962C8B-B14F-4D97-AF65-F5344CB8AC3E}">
@@ -6215,7 +6215,7 @@
                 <a:latin typeface="Cambria" panose="02040503050406030204" pitchFamily="18" charset="0"/>
                 <a:ea typeface="Cambria" panose="02040503050406030204" pitchFamily="18" charset="0"/>
               </a:rPr>
-              <a:t>We will explore each part:</a:t>
+              <a:t>Let’s explore each part:</a:t>
             </a:r>
             <a:endParaRPr lang="en-US" sz="2000" dirty="0">
               <a:latin typeface="Cambria" panose="02040503050406030204" pitchFamily="18" charset="0"/>
@@ -6488,7 +6488,7 @@
                 <a:latin typeface="Cambria" panose="02040503050406030204" pitchFamily="18" charset="0"/>
                 <a:ea typeface="Cambria" panose="02040503050406030204" pitchFamily="18" charset="0"/>
               </a:rPr>
-              <a:t>We explore each part:</a:t>
+              <a:t>Let’s each part:</a:t>
             </a:r>
           </a:p>
           <a:p>
@@ -6796,7 +6796,7 @@
                 <a:latin typeface="Cambria" panose="02040503050406030204" pitchFamily="18" charset="0"/>
                 <a:ea typeface="Cambria" panose="02040503050406030204" pitchFamily="18" charset="0"/>
               </a:rPr>
-              <a:t>We explore each part:</a:t>
+              <a:t>Let’s each part:</a:t>
             </a:r>
             <a:endParaRPr lang="en-US" sz="2000" dirty="0">
               <a:latin typeface="Cambria" panose="02040503050406030204" pitchFamily="18" charset="0"/>
@@ -7085,7 +7085,7 @@
                 <a:latin typeface="Cambria" panose="02040503050406030204" pitchFamily="18" charset="0"/>
                 <a:ea typeface="Cambria" panose="02040503050406030204" pitchFamily="18" charset="0"/>
               </a:rPr>
-              <a:t>We will explore each part:</a:t>
+              <a:t>Let’s explore each part:</a:t>
             </a:r>
             <a:endParaRPr lang="en-US" sz="2000" dirty="0">
               <a:latin typeface="Cambria" panose="02040503050406030204" pitchFamily="18" charset="0"/>
@@ -8178,6 +8178,7 @@
           </a:bodyPr>
           <a:lstStyle/>
           <a:p>
+            <a:pPr algn="just"/>
             <a:r>
               <a:rPr lang="en-US" sz="2000" b="1" dirty="0">
                 <a:latin typeface="Cambria" panose="02040503050406030204" pitchFamily="18" charset="0"/>
@@ -8194,12 +8195,14 @@
             </a:r>
           </a:p>
           <a:p>
+            <a:pPr algn="just"/>
             <a:endParaRPr lang="en-US" sz="2000" dirty="0">
               <a:latin typeface="Cambria" panose="02040503050406030204" pitchFamily="18" charset="0"/>
               <a:ea typeface="Cambria" panose="02040503050406030204" pitchFamily="18" charset="0"/>
             </a:endParaRPr>
           </a:p>
           <a:p>
+            <a:pPr algn="just"/>
             <a:r>
               <a:rPr lang="en-US" sz="2000" b="1" dirty="0">
                 <a:latin typeface="Cambria" panose="02040503050406030204" pitchFamily="18" charset="0"/>
@@ -8216,12 +8219,14 @@
             </a:r>
           </a:p>
           <a:p>
+            <a:pPr algn="just"/>
             <a:endParaRPr lang="en-US" sz="2000" dirty="0">
               <a:latin typeface="Cambria" panose="02040503050406030204" pitchFamily="18" charset="0"/>
               <a:ea typeface="Cambria" panose="02040503050406030204" pitchFamily="18" charset="0"/>
             </a:endParaRPr>
           </a:p>
           <a:p>
+            <a:pPr algn="just"/>
             <a:r>
               <a:rPr lang="en-US" sz="2000" b="1" dirty="0">
                 <a:latin typeface="Cambria" panose="02040503050406030204" pitchFamily="18" charset="0"/>
@@ -8238,12 +8243,14 @@
             </a:r>
           </a:p>
           <a:p>
+            <a:pPr algn="just"/>
             <a:endParaRPr lang="en-US" sz="2000" dirty="0">
               <a:latin typeface="Cambria" panose="02040503050406030204" pitchFamily="18" charset="0"/>
               <a:ea typeface="Cambria" panose="02040503050406030204" pitchFamily="18" charset="0"/>
             </a:endParaRPr>
           </a:p>
           <a:p>
+            <a:pPr algn="just"/>
             <a:r>
               <a:rPr lang="en-US" sz="2000" b="1" dirty="0">
                 <a:latin typeface="Cambria" panose="02040503050406030204" pitchFamily="18" charset="0"/>
@@ -8260,12 +8267,14 @@
             </a:r>
           </a:p>
           <a:p>
+            <a:pPr algn="just"/>
             <a:endParaRPr lang="en-US" sz="2000" dirty="0">
               <a:latin typeface="Cambria" panose="02040503050406030204" pitchFamily="18" charset="0"/>
               <a:ea typeface="Cambria" panose="02040503050406030204" pitchFamily="18" charset="0"/>
             </a:endParaRPr>
           </a:p>
           <a:p>
+            <a:pPr algn="just"/>
             <a:r>
               <a:rPr lang="en-US" sz="2000" dirty="0">
                 <a:latin typeface="Cambria" panose="02040503050406030204" pitchFamily="18" charset="0"/>

</xml_diff>